<commit_message>
update wire colors on ppt
</commit_message>
<xml_diff>
--- a/AtodTestPRU/TSL1401-BBBlue-interface.pptx
+++ b/AtodTestPRU/TSL1401-BBBlue-interface.pptx
@@ -6124,6 +6124,66 @@
           </a:p>
         </p:txBody>
       </p:sp>
+      <p:sp>
+        <p:nvSpPr>
+          <p:cNvPr id="81" name="TextBox 80"/>
+          <p:cNvSpPr txBox="1"/>
+          <p:nvPr/>
+        </p:nvSpPr>
+        <p:spPr>
+          <a:xfrm>
+            <a:off x="7603725" y="1079172"/>
+            <a:ext cx="463588" cy="369332"/>
+          </a:xfrm>
+          <a:prstGeom prst="rect">
+            <a:avLst/>
+          </a:prstGeom>
+          <a:noFill/>
+        </p:spPr>
+        <p:txBody>
+          <a:bodyPr wrap="none" rtlCol="0">
+            <a:spAutoFit/>
+          </a:bodyPr>
+          <a:lstStyle/>
+          <a:p>
+            <a:r>
+              <a:rPr lang="en-US" dirty="0" err="1" smtClean="0"/>
+              <a:t>blk</a:t>
+            </a:r>
+            <a:endParaRPr lang="en-US" dirty="0"/>
+          </a:p>
+        </p:txBody>
+      </p:sp>
+      <p:sp>
+        <p:nvSpPr>
+          <p:cNvPr id="84" name="TextBox 83"/>
+          <p:cNvSpPr txBox="1"/>
+          <p:nvPr/>
+        </p:nvSpPr>
+        <p:spPr>
+          <a:xfrm>
+            <a:off x="6998814" y="1072891"/>
+            <a:ext cx="546432" cy="369332"/>
+          </a:xfrm>
+          <a:prstGeom prst="rect">
+            <a:avLst/>
+          </a:prstGeom>
+          <a:noFill/>
+        </p:spPr>
+        <p:txBody>
+          <a:bodyPr wrap="none" rtlCol="0">
+            <a:spAutoFit/>
+          </a:bodyPr>
+          <a:lstStyle/>
+          <a:p>
+            <a:r>
+              <a:rPr lang="en-US" dirty="0" err="1" smtClean="0"/>
+              <a:t>wht</a:t>
+            </a:r>
+            <a:endParaRPr lang="en-US" dirty="0"/>
+          </a:p>
+        </p:txBody>
+      </p:sp>
     </p:spTree>
     <p:extLst>
       <p:ext uri="{BB962C8B-B14F-4D97-AF65-F5344CB8AC3E}">

</xml_diff>